<commit_message>
basic game loop working
you can light beacons one at a time.  not required to walk on a path
(yet) tho
</commit_message>
<xml_diff>
--- a/docs/8NightsVRDesign.pptx
+++ b/docs/8NightsVRDesign.pptx
@@ -259,7 +259,7 @@
           <a:p>
             <a:fld id="{8A733DA4-D56C-479F-9AE8-3CF782CB7FF4}" type="datetimeFigureOut">
               <a:rPr lang="en-US" smtClean="0"/>
-              <a:t>9/29/2015</a:t>
+              <a:t>10/9/2015</a:t>
             </a:fld>
             <a:endParaRPr lang="en-US"/>
           </a:p>
@@ -429,7 +429,7 @@
           <a:p>
             <a:fld id="{8A733DA4-D56C-479F-9AE8-3CF782CB7FF4}" type="datetimeFigureOut">
               <a:rPr lang="en-US" smtClean="0"/>
-              <a:t>9/29/2015</a:t>
+              <a:t>10/9/2015</a:t>
             </a:fld>
             <a:endParaRPr lang="en-US"/>
           </a:p>
@@ -609,7 +609,7 @@
           <a:p>
             <a:fld id="{8A733DA4-D56C-479F-9AE8-3CF782CB7FF4}" type="datetimeFigureOut">
               <a:rPr lang="en-US" smtClean="0"/>
-              <a:t>9/29/2015</a:t>
+              <a:t>10/9/2015</a:t>
             </a:fld>
             <a:endParaRPr lang="en-US"/>
           </a:p>
@@ -779,7 +779,7 @@
           <a:p>
             <a:fld id="{8A733DA4-D56C-479F-9AE8-3CF782CB7FF4}" type="datetimeFigureOut">
               <a:rPr lang="en-US" smtClean="0"/>
-              <a:t>9/29/2015</a:t>
+              <a:t>10/9/2015</a:t>
             </a:fld>
             <a:endParaRPr lang="en-US"/>
           </a:p>
@@ -1025,7 +1025,7 @@
           <a:p>
             <a:fld id="{8A733DA4-D56C-479F-9AE8-3CF782CB7FF4}" type="datetimeFigureOut">
               <a:rPr lang="en-US" smtClean="0"/>
-              <a:t>9/29/2015</a:t>
+              <a:t>10/9/2015</a:t>
             </a:fld>
             <a:endParaRPr lang="en-US"/>
           </a:p>
@@ -1257,7 +1257,7 @@
           <a:p>
             <a:fld id="{8A733DA4-D56C-479F-9AE8-3CF782CB7FF4}" type="datetimeFigureOut">
               <a:rPr lang="en-US" smtClean="0"/>
-              <a:t>9/29/2015</a:t>
+              <a:t>10/9/2015</a:t>
             </a:fld>
             <a:endParaRPr lang="en-US"/>
           </a:p>
@@ -1624,7 +1624,7 @@
           <a:p>
             <a:fld id="{8A733DA4-D56C-479F-9AE8-3CF782CB7FF4}" type="datetimeFigureOut">
               <a:rPr lang="en-US" smtClean="0"/>
-              <a:t>9/29/2015</a:t>
+              <a:t>10/9/2015</a:t>
             </a:fld>
             <a:endParaRPr lang="en-US"/>
           </a:p>
@@ -1742,7 +1742,7 @@
           <a:p>
             <a:fld id="{8A733DA4-D56C-479F-9AE8-3CF782CB7FF4}" type="datetimeFigureOut">
               <a:rPr lang="en-US" smtClean="0"/>
-              <a:t>9/29/2015</a:t>
+              <a:t>10/9/2015</a:t>
             </a:fld>
             <a:endParaRPr lang="en-US"/>
           </a:p>
@@ -1837,7 +1837,7 @@
           <a:p>
             <a:fld id="{8A733DA4-D56C-479F-9AE8-3CF782CB7FF4}" type="datetimeFigureOut">
               <a:rPr lang="en-US" smtClean="0"/>
-              <a:t>9/29/2015</a:t>
+              <a:t>10/9/2015</a:t>
             </a:fld>
             <a:endParaRPr lang="en-US"/>
           </a:p>
@@ -2114,7 +2114,7 @@
           <a:p>
             <a:fld id="{8A733DA4-D56C-479F-9AE8-3CF782CB7FF4}" type="datetimeFigureOut">
               <a:rPr lang="en-US" smtClean="0"/>
-              <a:t>9/29/2015</a:t>
+              <a:t>10/9/2015</a:t>
             </a:fld>
             <a:endParaRPr lang="en-US"/>
           </a:p>
@@ -2367,7 +2367,7 @@
           <a:p>
             <a:fld id="{8A733DA4-D56C-479F-9AE8-3CF782CB7FF4}" type="datetimeFigureOut">
               <a:rPr lang="en-US" smtClean="0"/>
-              <a:t>9/29/2015</a:t>
+              <a:t>10/9/2015</a:t>
             </a:fld>
             <a:endParaRPr lang="en-US"/>
           </a:p>
@@ -2580,7 +2580,7 @@
           <a:p>
             <a:fld id="{8A733DA4-D56C-479F-9AE8-3CF782CB7FF4}" type="datetimeFigureOut">
               <a:rPr lang="en-US" smtClean="0"/>
-              <a:t>9/29/2015</a:t>
+              <a:t>10/9/2015</a:t>
             </a:fld>
             <a:endParaRPr lang="en-US"/>
           </a:p>
@@ -12754,30 +12754,14 @@
             <a:pPr algn="ctr"/>
             <a:r>
               <a:rPr lang="en-US" sz="3600" dirty="0" smtClean="0"/>
-              <a:t>We swap in people until all the beacons are </a:t>
-            </a:r>
-            <a:r>
-              <a:rPr lang="en-US" sz="3600" dirty="0" smtClean="0"/>
-              <a:t>lit and 8 voices are singing.   Should </a:t>
-            </a:r>
-            <a:r>
-              <a:rPr lang="en-US" sz="3600" dirty="0" smtClean="0"/>
-              <a:t>take about 20 minutes in total.  </a:t>
-            </a:r>
-            <a:r>
-              <a:rPr lang="en-US" sz="3600" dirty="0" smtClean="0"/>
-              <a:t/>
+              <a:t>We swap in people until all the beacons are lit and 8 voices are singing.   Should take about 20 minutes in total.  </a:t>
             </a:r>
             <a:br>
               <a:rPr lang="en-US" sz="3600" dirty="0" smtClean="0"/>
             </a:br>
             <a:r>
               <a:rPr lang="en-US" sz="3600" dirty="0" smtClean="0"/>
-              <a:t>The </a:t>
-            </a:r>
-            <a:r>
-              <a:rPr lang="en-US" sz="3600" dirty="0" smtClean="0"/>
-              <a:t>room has gone for dark + mysterious to vibrant + joyous</a:t>
+              <a:t>The room has gone for dark + mysterious to vibrant + joyous</a:t>
             </a:r>
             <a:endParaRPr lang="en-US" sz="3600" dirty="0"/>
           </a:p>
@@ -14289,7 +14273,7 @@
         <p:spPr>
           <a:xfrm>
             <a:off x="1955602" y="224093"/>
-            <a:ext cx="8576066" cy="769441"/>
+            <a:ext cx="8936614" cy="769441"/>
           </a:xfrm>
           <a:prstGeom prst="rect">
             <a:avLst/>
@@ -14303,7 +14287,11 @@
           <a:p>
             <a:r>
               <a:rPr lang="en-US" sz="4400" dirty="0" smtClean="0"/>
-              <a:t>Goal: Illuminate 8 Beacon Sculptures</a:t>
+              <a:t>Goal: Illuminate 8 </a:t>
+            </a:r>
+            <a:r>
+              <a:rPr lang="en-US" sz="4400" dirty="0" smtClean="0"/>
+              <a:t>“Candle” Sculptures</a:t>
             </a:r>
             <a:endParaRPr lang="en-US" sz="4400" dirty="0"/>
           </a:p>
@@ -15466,7 +15454,7 @@
         <p:spPr>
           <a:xfrm>
             <a:off x="4734058" y="33709"/>
-            <a:ext cx="2092368" cy="769441"/>
+            <a:ext cx="2443298" cy="769441"/>
           </a:xfrm>
           <a:prstGeom prst="rect">
             <a:avLst/>
@@ -15480,7 +15468,7 @@
           <a:p>
             <a:r>
               <a:rPr lang="en-US" sz="4400" dirty="0" smtClean="0"/>
-              <a:t>Beacons</a:t>
+              <a:t>“Candles”</a:t>
             </a:r>
             <a:endParaRPr lang="en-US" sz="4400" dirty="0"/>
           </a:p>

</xml_diff>